<commit_message>
Deploying to gh-pages from @ ang-zeyu/morsels@1191ec2eea48f61540823b04e9770a94206c9940 🚀
</commit_message>
<xml_diff>
--- a/images/architecture.pptx
+++ b/images/architecture.pptx
@@ -261,7 +261,7 @@
           <a:p>
             <a:fld id="{4B3D9AB3-1BEE-469F-B79E-0D7A28C81A9F}" type="datetimeFigureOut">
               <a:rPr lang="en-SG" smtClean="0"/>
-              <a:t>29/1/2022</a:t>
+              <a:t>17/5/2022</a:t>
             </a:fld>
             <a:endParaRPr lang="en-SG"/>
           </a:p>
@@ -461,7 +461,7 @@
           <a:p>
             <a:fld id="{4B3D9AB3-1BEE-469F-B79E-0D7A28C81A9F}" type="datetimeFigureOut">
               <a:rPr lang="en-SG" smtClean="0"/>
-              <a:t>29/1/2022</a:t>
+              <a:t>17/5/2022</a:t>
             </a:fld>
             <a:endParaRPr lang="en-SG"/>
           </a:p>
@@ -671,7 +671,7 @@
           <a:p>
             <a:fld id="{4B3D9AB3-1BEE-469F-B79E-0D7A28C81A9F}" type="datetimeFigureOut">
               <a:rPr lang="en-SG" smtClean="0"/>
-              <a:t>29/1/2022</a:t>
+              <a:t>17/5/2022</a:t>
             </a:fld>
             <a:endParaRPr lang="en-SG"/>
           </a:p>
@@ -871,7 +871,7 @@
           <a:p>
             <a:fld id="{4B3D9AB3-1BEE-469F-B79E-0D7A28C81A9F}" type="datetimeFigureOut">
               <a:rPr lang="en-SG" smtClean="0"/>
-              <a:t>29/1/2022</a:t>
+              <a:t>17/5/2022</a:t>
             </a:fld>
             <a:endParaRPr lang="en-SG"/>
           </a:p>
@@ -1147,7 +1147,7 @@
           <a:p>
             <a:fld id="{4B3D9AB3-1BEE-469F-B79E-0D7A28C81A9F}" type="datetimeFigureOut">
               <a:rPr lang="en-SG" smtClean="0"/>
-              <a:t>29/1/2022</a:t>
+              <a:t>17/5/2022</a:t>
             </a:fld>
             <a:endParaRPr lang="en-SG"/>
           </a:p>
@@ -1415,7 +1415,7 @@
           <a:p>
             <a:fld id="{4B3D9AB3-1BEE-469F-B79E-0D7A28C81A9F}" type="datetimeFigureOut">
               <a:rPr lang="en-SG" smtClean="0"/>
-              <a:t>29/1/2022</a:t>
+              <a:t>17/5/2022</a:t>
             </a:fld>
             <a:endParaRPr lang="en-SG"/>
           </a:p>
@@ -1830,7 +1830,7 @@
           <a:p>
             <a:fld id="{4B3D9AB3-1BEE-469F-B79E-0D7A28C81A9F}" type="datetimeFigureOut">
               <a:rPr lang="en-SG" smtClean="0"/>
-              <a:t>29/1/2022</a:t>
+              <a:t>17/5/2022</a:t>
             </a:fld>
             <a:endParaRPr lang="en-SG"/>
           </a:p>
@@ -1972,7 +1972,7 @@
           <a:p>
             <a:fld id="{4B3D9AB3-1BEE-469F-B79E-0D7A28C81A9F}" type="datetimeFigureOut">
               <a:rPr lang="en-SG" smtClean="0"/>
-              <a:t>29/1/2022</a:t>
+              <a:t>17/5/2022</a:t>
             </a:fld>
             <a:endParaRPr lang="en-SG"/>
           </a:p>
@@ -2085,7 +2085,7 @@
           <a:p>
             <a:fld id="{4B3D9AB3-1BEE-469F-B79E-0D7A28C81A9F}" type="datetimeFigureOut">
               <a:rPr lang="en-SG" smtClean="0"/>
-              <a:t>29/1/2022</a:t>
+              <a:t>17/5/2022</a:t>
             </a:fld>
             <a:endParaRPr lang="en-SG"/>
           </a:p>
@@ -2398,7 +2398,7 @@
           <a:p>
             <a:fld id="{4B3D9AB3-1BEE-469F-B79E-0D7A28C81A9F}" type="datetimeFigureOut">
               <a:rPr lang="en-SG" smtClean="0"/>
-              <a:t>29/1/2022</a:t>
+              <a:t>17/5/2022</a:t>
             </a:fld>
             <a:endParaRPr lang="en-SG"/>
           </a:p>
@@ -2687,7 +2687,7 @@
           <a:p>
             <a:fld id="{4B3D9AB3-1BEE-469F-B79E-0D7A28C81A9F}" type="datetimeFigureOut">
               <a:rPr lang="en-SG" smtClean="0"/>
-              <a:t>29/1/2022</a:t>
+              <a:t>17/5/2022</a:t>
             </a:fld>
             <a:endParaRPr lang="en-SG"/>
           </a:p>
@@ -2930,7 +2930,7 @@
           <a:p>
             <a:fld id="{4B3D9AB3-1BEE-469F-B79E-0D7A28C81A9F}" type="datetimeFigureOut">
               <a:rPr lang="en-SG" smtClean="0"/>
-              <a:t>29/1/2022</a:t>
+              <a:t>17/5/2022</a:t>
             </a:fld>
             <a:endParaRPr lang="en-SG"/>
           </a:p>
@@ -3361,8 +3361,8 @@
         </p:nvSpPr>
         <p:spPr>
           <a:xfrm>
-            <a:off x="525294" y="343711"/>
-            <a:ext cx="1880680" cy="1361872"/>
+            <a:off x="525294" y="390726"/>
+            <a:ext cx="1880680" cy="1267841"/>
           </a:xfrm>
           <a:prstGeom prst="roundRect">
             <a:avLst/>
@@ -3393,8 +3393,8 @@
             <a:r>
               <a:rPr lang="en-SG" dirty="0">
                 <a:solidFill>
-                  <a:schemeClr val="accent2">
-                    <a:lumMod val="75000"/>
+                  <a:schemeClr val="bg2">
+                    <a:lumMod val="10000"/>
                   </a:schemeClr>
                 </a:solidFill>
               </a:rPr>
@@ -3442,6 +3442,12 @@
           <a:prstGeom prst="roundRect">
             <a:avLst/>
           </a:prstGeom>
+          <a:solidFill>
+            <a:schemeClr val="accent4">
+              <a:lumMod val="40000"/>
+              <a:lumOff val="60000"/>
+            </a:schemeClr>
+          </a:solidFill>
           <a:ln>
             <a:noFill/>
           </a:ln>
@@ -3466,23 +3472,20 @@
           <a:p>
             <a:pPr algn="ctr"/>
             <a:r>
-              <a:rPr lang="en-SG" dirty="0">
+              <a:rPr lang="en-SG" b="1" dirty="0" err="1">
                 <a:solidFill>
                   <a:schemeClr val="tx1"/>
                 </a:solidFill>
               </a:rPr>
-              <a:t>Morsels’ </a:t>
-            </a:r>
-          </a:p>
-          <a:p>
-            <a:pPr algn="ctr"/>
-            <a:r>
-              <a:rPr lang="en-SG" dirty="0">
+              <a:t>Cli</a:t>
+            </a:r>
+            <a:r>
+              <a:rPr lang="en-SG" b="1" dirty="0">
                 <a:solidFill>
                   <a:schemeClr val="tx1"/>
                 </a:solidFill>
               </a:rPr>
-              <a:t>cli indexer tool</a:t>
+              <a:t> indexer tool</a:t>
             </a:r>
           </a:p>
         </p:txBody>
@@ -3582,7 +3585,7 @@
               <a:t>Inverted </a:t>
             </a:r>
             <a:r>
-              <a:rPr lang="en-SG" dirty="0">
+              <a:rPr lang="en-SG" b="1" dirty="0">
                 <a:solidFill>
                   <a:schemeClr val="accent6">
                     <a:lumMod val="75000"/>
@@ -3595,16 +3598,6 @@
           <a:p>
             <a:pPr algn="ctr"/>
             <a:r>
-              <a:rPr lang="en-SG" dirty="0">
-                <a:solidFill>
-                  <a:schemeClr val="accent6">
-                    <a:lumMod val="75000"/>
-                  </a:schemeClr>
-                </a:solidFill>
-              </a:rPr>
-              <a:t>File</a:t>
-            </a:r>
-            <a:r>
               <a:rPr lang="en-SG" b="1" dirty="0">
                 <a:solidFill>
                   <a:schemeClr val="accent6">
@@ -3612,7 +3605,7 @@
                   </a:schemeClr>
                 </a:solidFill>
               </a:rPr>
-              <a:t>(s)</a:t>
+              <a:t>File(s)</a:t>
             </a:r>
           </a:p>
         </p:txBody>
@@ -3669,7 +3662,7 @@
               <a:t>Json </a:t>
             </a:r>
             <a:r>
-              <a:rPr lang="en-SG" dirty="0">
+              <a:rPr lang="en-SG" b="1" dirty="0">
                 <a:solidFill>
                   <a:schemeClr val="accent4">
                     <a:lumMod val="75000"/>
@@ -3903,10 +3896,12 @@
         <p:spPr>
           <a:xfrm>
             <a:off x="278859" y="3897548"/>
-            <a:ext cx="10000035" cy="2866417"/>
+            <a:ext cx="9656323" cy="2866417"/>
           </a:xfrm>
           <a:prstGeom prst="roundRect">
-            <a:avLst/>
+            <a:avLst>
+              <a:gd name="adj" fmla="val 8523"/>
+            </a:avLst>
           </a:prstGeom>
           <a:noFill/>
         </p:spPr>
@@ -3949,15 +3944,24 @@
         </p:nvSpPr>
         <p:spPr>
           <a:xfrm>
-            <a:off x="8746788" y="4133720"/>
-            <a:ext cx="1322959" cy="1008437"/>
+            <a:off x="8466311" y="4027250"/>
+            <a:ext cx="1322959" cy="875224"/>
           </a:xfrm>
           <a:prstGeom prst="roundRect">
-            <a:avLst/>
+            <a:avLst>
+              <a:gd name="adj" fmla="val 20525"/>
+            </a:avLst>
           </a:prstGeom>
+          <a:solidFill>
+            <a:schemeClr val="accent4">
+              <a:lumMod val="40000"/>
+              <a:lumOff val="60000"/>
+            </a:schemeClr>
+          </a:solidFill>
           <a:ln>
             <a:noFill/>
           </a:ln>
+          <a:effectLst/>
         </p:spPr>
         <p:style>
           <a:lnRef idx="0">
@@ -3979,28 +3983,12 @@
           <a:p>
             <a:pPr algn="ctr"/>
             <a:r>
-              <a:rPr lang="en-SG" dirty="0">
+              <a:rPr lang="en-SG" b="1" dirty="0">
                 <a:solidFill>
                   <a:schemeClr val="tx1"/>
                 </a:solidFill>
               </a:rPr>
-              <a:t>Morsels’ search </a:t>
-            </a:r>
-            <a:r>
-              <a:rPr lang="en-SG" dirty="0" err="1">
-                <a:solidFill>
-                  <a:schemeClr val="tx1"/>
-                </a:solidFill>
-              </a:rPr>
-              <a:t>ui</a:t>
-            </a:r>
-            <a:r>
-              <a:rPr lang="en-SG" dirty="0">
-                <a:solidFill>
-                  <a:schemeClr val="tx1"/>
-                </a:solidFill>
-              </a:rPr>
-              <a:t> / library</a:t>
+              <a:t>Search UI &amp; library</a:t>
             </a:r>
           </a:p>
         </p:txBody>
@@ -4079,7 +4067,7 @@
               <a:t>Parse, Process, and figure out which </a:t>
             </a:r>
             <a:r>
-              <a:rPr lang="en-SG" dirty="0">
+              <a:rPr lang="en-SG" b="1" dirty="0">
                 <a:solidFill>
                   <a:schemeClr val="accent6">
                     <a:lumMod val="75000"/>
@@ -4128,26 +4116,26 @@
               <a:t>Retrieve </a:t>
             </a:r>
             <a:r>
-              <a:rPr lang="en-SG" dirty="0">
+              <a:rPr lang="en-SG" b="1" dirty="0">
                 <a:solidFill>
                   <a:schemeClr val="accent6">
                     <a:lumMod val="75000"/>
                   </a:schemeClr>
                 </a:solidFill>
               </a:rPr>
-              <a:t>Index</a:t>
-            </a:r>
-          </a:p>
-          <a:p>
-            <a:r>
-              <a:rPr lang="en-SG" dirty="0">
+              <a:t>index</a:t>
+            </a:r>
+          </a:p>
+          <a:p>
+            <a:r>
+              <a:rPr lang="en-SG" b="1" dirty="0">
                 <a:solidFill>
                   <a:schemeClr val="accent6">
                     <a:lumMod val="75000"/>
                   </a:schemeClr>
                 </a:solidFill>
               </a:rPr>
-              <a:t>Files</a:t>
+              <a:t>files</a:t>
             </a:r>
             <a:r>
               <a:rPr lang="en-SG" dirty="0"/>
@@ -4224,7 +4212,7 @@
               <a:t>Retrieve </a:t>
             </a:r>
             <a:r>
-              <a:rPr lang="en-SG" dirty="0">
+              <a:rPr lang="en-SG" b="1" dirty="0">
                 <a:solidFill>
                   <a:schemeClr val="accent4">
                     <a:lumMod val="75000"/>
@@ -4235,7 +4223,7 @@
             </a:r>
             <a:r>
               <a:rPr lang="en-SG" dirty="0"/>
-              <a:t>of result set from cache or network request</a:t>
+              <a:t>of results from cache or network request</a:t>
             </a:r>
           </a:p>
         </p:txBody>
@@ -4287,7 +4275,7 @@
               <a:t>Use </a:t>
             </a:r>
             <a:r>
-              <a:rPr lang="en-SG" dirty="0">
+              <a:rPr lang="en-SG" b="1" dirty="0">
                 <a:solidFill>
                   <a:schemeClr val="accent4">
                     <a:lumMod val="75000"/>
@@ -4303,16 +4291,16 @@
             <a:r>
               <a:rPr lang="en-SG" dirty="0">
                 <a:solidFill>
-                  <a:schemeClr val="accent2">
-                    <a:lumMod val="75000"/>
+                  <a:schemeClr val="bg2">
+                    <a:lumMod val="10000"/>
                   </a:schemeClr>
                 </a:solidFill>
               </a:rPr>
-              <a:t>corpus’</a:t>
+              <a:t>corpus’ </a:t>
             </a:r>
             <a:r>
               <a:rPr lang="en-SG" dirty="0"/>
-              <a:t> source files to generate </a:t>
+              <a:t>source files to generate </a:t>
             </a:r>
             <a:r>
               <a:rPr lang="en-SG" b="1" dirty="0"/>

</xml_diff>

<commit_message>
Deploying to gh-pages from @ ang-zeyu/morsels@08c14fa2e9840382505dd80db4a1aa3db5650833 🚀
</commit_message>
<xml_diff>
--- a/images/architecture.pptx
+++ b/images/architecture.pptx
@@ -261,7 +261,7 @@
           <a:p>
             <a:fld id="{4B3D9AB3-1BEE-469F-B79E-0D7A28C81A9F}" type="datetimeFigureOut">
               <a:rPr lang="en-SG" smtClean="0"/>
-              <a:t>17/5/2022</a:t>
+              <a:t>29/1/2022</a:t>
             </a:fld>
             <a:endParaRPr lang="en-SG"/>
           </a:p>
@@ -461,7 +461,7 @@
           <a:p>
             <a:fld id="{4B3D9AB3-1BEE-469F-B79E-0D7A28C81A9F}" type="datetimeFigureOut">
               <a:rPr lang="en-SG" smtClean="0"/>
-              <a:t>17/5/2022</a:t>
+              <a:t>29/1/2022</a:t>
             </a:fld>
             <a:endParaRPr lang="en-SG"/>
           </a:p>
@@ -671,7 +671,7 @@
           <a:p>
             <a:fld id="{4B3D9AB3-1BEE-469F-B79E-0D7A28C81A9F}" type="datetimeFigureOut">
               <a:rPr lang="en-SG" smtClean="0"/>
-              <a:t>17/5/2022</a:t>
+              <a:t>29/1/2022</a:t>
             </a:fld>
             <a:endParaRPr lang="en-SG"/>
           </a:p>
@@ -871,7 +871,7 @@
           <a:p>
             <a:fld id="{4B3D9AB3-1BEE-469F-B79E-0D7A28C81A9F}" type="datetimeFigureOut">
               <a:rPr lang="en-SG" smtClean="0"/>
-              <a:t>17/5/2022</a:t>
+              <a:t>29/1/2022</a:t>
             </a:fld>
             <a:endParaRPr lang="en-SG"/>
           </a:p>
@@ -1147,7 +1147,7 @@
           <a:p>
             <a:fld id="{4B3D9AB3-1BEE-469F-B79E-0D7A28C81A9F}" type="datetimeFigureOut">
               <a:rPr lang="en-SG" smtClean="0"/>
-              <a:t>17/5/2022</a:t>
+              <a:t>29/1/2022</a:t>
             </a:fld>
             <a:endParaRPr lang="en-SG"/>
           </a:p>
@@ -1415,7 +1415,7 @@
           <a:p>
             <a:fld id="{4B3D9AB3-1BEE-469F-B79E-0D7A28C81A9F}" type="datetimeFigureOut">
               <a:rPr lang="en-SG" smtClean="0"/>
-              <a:t>17/5/2022</a:t>
+              <a:t>29/1/2022</a:t>
             </a:fld>
             <a:endParaRPr lang="en-SG"/>
           </a:p>
@@ -1830,7 +1830,7 @@
           <a:p>
             <a:fld id="{4B3D9AB3-1BEE-469F-B79E-0D7A28C81A9F}" type="datetimeFigureOut">
               <a:rPr lang="en-SG" smtClean="0"/>
-              <a:t>17/5/2022</a:t>
+              <a:t>29/1/2022</a:t>
             </a:fld>
             <a:endParaRPr lang="en-SG"/>
           </a:p>
@@ -1972,7 +1972,7 @@
           <a:p>
             <a:fld id="{4B3D9AB3-1BEE-469F-B79E-0D7A28C81A9F}" type="datetimeFigureOut">
               <a:rPr lang="en-SG" smtClean="0"/>
-              <a:t>17/5/2022</a:t>
+              <a:t>29/1/2022</a:t>
             </a:fld>
             <a:endParaRPr lang="en-SG"/>
           </a:p>
@@ -2085,7 +2085,7 @@
           <a:p>
             <a:fld id="{4B3D9AB3-1BEE-469F-B79E-0D7A28C81A9F}" type="datetimeFigureOut">
               <a:rPr lang="en-SG" smtClean="0"/>
-              <a:t>17/5/2022</a:t>
+              <a:t>29/1/2022</a:t>
             </a:fld>
             <a:endParaRPr lang="en-SG"/>
           </a:p>
@@ -2398,7 +2398,7 @@
           <a:p>
             <a:fld id="{4B3D9AB3-1BEE-469F-B79E-0D7A28C81A9F}" type="datetimeFigureOut">
               <a:rPr lang="en-SG" smtClean="0"/>
-              <a:t>17/5/2022</a:t>
+              <a:t>29/1/2022</a:t>
             </a:fld>
             <a:endParaRPr lang="en-SG"/>
           </a:p>
@@ -2687,7 +2687,7 @@
           <a:p>
             <a:fld id="{4B3D9AB3-1BEE-469F-B79E-0D7A28C81A9F}" type="datetimeFigureOut">
               <a:rPr lang="en-SG" smtClean="0"/>
-              <a:t>17/5/2022</a:t>
+              <a:t>29/1/2022</a:t>
             </a:fld>
             <a:endParaRPr lang="en-SG"/>
           </a:p>
@@ -2930,7 +2930,7 @@
           <a:p>
             <a:fld id="{4B3D9AB3-1BEE-469F-B79E-0D7A28C81A9F}" type="datetimeFigureOut">
               <a:rPr lang="en-SG" smtClean="0"/>
-              <a:t>17/5/2022</a:t>
+              <a:t>29/1/2022</a:t>
             </a:fld>
             <a:endParaRPr lang="en-SG"/>
           </a:p>
@@ -3361,8 +3361,8 @@
         </p:nvSpPr>
         <p:spPr>
           <a:xfrm>
-            <a:off x="525294" y="390726"/>
-            <a:ext cx="1880680" cy="1267841"/>
+            <a:off x="525294" y="343711"/>
+            <a:ext cx="1880680" cy="1361872"/>
           </a:xfrm>
           <a:prstGeom prst="roundRect">
             <a:avLst/>
@@ -3393,8 +3393,8 @@
             <a:r>
               <a:rPr lang="en-SG" dirty="0">
                 <a:solidFill>
-                  <a:schemeClr val="bg2">
-                    <a:lumMod val="10000"/>
+                  <a:schemeClr val="accent2">
+                    <a:lumMod val="75000"/>
                   </a:schemeClr>
                 </a:solidFill>
               </a:rPr>
@@ -3442,12 +3442,6 @@
           <a:prstGeom prst="roundRect">
             <a:avLst/>
           </a:prstGeom>
-          <a:solidFill>
-            <a:schemeClr val="accent4">
-              <a:lumMod val="40000"/>
-              <a:lumOff val="60000"/>
-            </a:schemeClr>
-          </a:solidFill>
           <a:ln>
             <a:noFill/>
           </a:ln>
@@ -3472,20 +3466,23 @@
           <a:p>
             <a:pPr algn="ctr"/>
             <a:r>
-              <a:rPr lang="en-SG" b="1" dirty="0" err="1">
+              <a:rPr lang="en-SG" dirty="0">
                 <a:solidFill>
                   <a:schemeClr val="tx1"/>
                 </a:solidFill>
               </a:rPr>
-              <a:t>Cli</a:t>
-            </a:r>
-            <a:r>
-              <a:rPr lang="en-SG" b="1" dirty="0">
+              <a:t>Morsels’ </a:t>
+            </a:r>
+          </a:p>
+          <a:p>
+            <a:pPr algn="ctr"/>
+            <a:r>
+              <a:rPr lang="en-SG" dirty="0">
                 <a:solidFill>
                   <a:schemeClr val="tx1"/>
                 </a:solidFill>
               </a:rPr>
-              <a:t> indexer tool</a:t>
+              <a:t>cli indexer tool</a:t>
             </a:r>
           </a:p>
         </p:txBody>
@@ -3585,6 +3582,29 @@
               <a:t>Inverted </a:t>
             </a:r>
             <a:r>
+              <a:rPr lang="en-SG" dirty="0">
+                <a:solidFill>
+                  <a:schemeClr val="accent6">
+                    <a:lumMod val="75000"/>
+                  </a:schemeClr>
+                </a:solidFill>
+              </a:rPr>
+              <a:t>Index</a:t>
+            </a:r>
+          </a:p>
+          <a:p>
+            <a:pPr algn="ctr"/>
+            <a:r>
+              <a:rPr lang="en-SG" dirty="0">
+                <a:solidFill>
+                  <a:schemeClr val="accent6">
+                    <a:lumMod val="75000"/>
+                  </a:schemeClr>
+                </a:solidFill>
+              </a:rPr>
+              <a:t>File</a:t>
+            </a:r>
+            <a:r>
               <a:rPr lang="en-SG" b="1" dirty="0">
                 <a:solidFill>
                   <a:schemeClr val="accent6">
@@ -3592,20 +3612,7 @@
                   </a:schemeClr>
                 </a:solidFill>
               </a:rPr>
-              <a:t>Index</a:t>
-            </a:r>
-          </a:p>
-          <a:p>
-            <a:pPr algn="ctr"/>
-            <a:r>
-              <a:rPr lang="en-SG" b="1" dirty="0">
-                <a:solidFill>
-                  <a:schemeClr val="accent6">
-                    <a:lumMod val="75000"/>
-                  </a:schemeClr>
-                </a:solidFill>
-              </a:rPr>
-              <a:t>File(s)</a:t>
+              <a:t>(s)</a:t>
             </a:r>
           </a:p>
         </p:txBody>
@@ -3662,7 +3669,7 @@
               <a:t>Json </a:t>
             </a:r>
             <a:r>
-              <a:rPr lang="en-SG" b="1" dirty="0">
+              <a:rPr lang="en-SG" dirty="0">
                 <a:solidFill>
                   <a:schemeClr val="accent4">
                     <a:lumMod val="75000"/>
@@ -3896,12 +3903,10 @@
         <p:spPr>
           <a:xfrm>
             <a:off x="278859" y="3897548"/>
-            <a:ext cx="9656323" cy="2866417"/>
+            <a:ext cx="10000035" cy="2866417"/>
           </a:xfrm>
           <a:prstGeom prst="roundRect">
-            <a:avLst>
-              <a:gd name="adj" fmla="val 8523"/>
-            </a:avLst>
+            <a:avLst/>
           </a:prstGeom>
           <a:noFill/>
         </p:spPr>
@@ -3944,24 +3949,15 @@
         </p:nvSpPr>
         <p:spPr>
           <a:xfrm>
-            <a:off x="8466311" y="4027250"/>
-            <a:ext cx="1322959" cy="875224"/>
+            <a:off x="8746788" y="4133720"/>
+            <a:ext cx="1322959" cy="1008437"/>
           </a:xfrm>
           <a:prstGeom prst="roundRect">
-            <a:avLst>
-              <a:gd name="adj" fmla="val 20525"/>
-            </a:avLst>
+            <a:avLst/>
           </a:prstGeom>
-          <a:solidFill>
-            <a:schemeClr val="accent4">
-              <a:lumMod val="40000"/>
-              <a:lumOff val="60000"/>
-            </a:schemeClr>
-          </a:solidFill>
           <a:ln>
             <a:noFill/>
           </a:ln>
-          <a:effectLst/>
         </p:spPr>
         <p:style>
           <a:lnRef idx="0">
@@ -3983,12 +3979,28 @@
           <a:p>
             <a:pPr algn="ctr"/>
             <a:r>
-              <a:rPr lang="en-SG" b="1" dirty="0">
+              <a:rPr lang="en-SG" dirty="0">
                 <a:solidFill>
                   <a:schemeClr val="tx1"/>
                 </a:solidFill>
               </a:rPr>
-              <a:t>Search UI &amp; library</a:t>
+              <a:t>Morsels’ search </a:t>
+            </a:r>
+            <a:r>
+              <a:rPr lang="en-SG" dirty="0" err="1">
+                <a:solidFill>
+                  <a:schemeClr val="tx1"/>
+                </a:solidFill>
+              </a:rPr>
+              <a:t>ui</a:t>
+            </a:r>
+            <a:r>
+              <a:rPr lang="en-SG" dirty="0">
+                <a:solidFill>
+                  <a:schemeClr val="tx1"/>
+                </a:solidFill>
+              </a:rPr>
+              <a:t> / library</a:t>
             </a:r>
           </a:p>
         </p:txBody>
@@ -4067,7 +4079,7 @@
               <a:t>Parse, Process, and figure out which </a:t>
             </a:r>
             <a:r>
-              <a:rPr lang="en-SG" b="1" dirty="0">
+              <a:rPr lang="en-SG" dirty="0">
                 <a:solidFill>
                   <a:schemeClr val="accent6">
                     <a:lumMod val="75000"/>
@@ -4116,26 +4128,26 @@
               <a:t>Retrieve </a:t>
             </a:r>
             <a:r>
-              <a:rPr lang="en-SG" b="1" dirty="0">
+              <a:rPr lang="en-SG" dirty="0">
                 <a:solidFill>
                   <a:schemeClr val="accent6">
                     <a:lumMod val="75000"/>
                   </a:schemeClr>
                 </a:solidFill>
               </a:rPr>
-              <a:t>index</a:t>
-            </a:r>
-          </a:p>
-          <a:p>
-            <a:r>
-              <a:rPr lang="en-SG" b="1" dirty="0">
+              <a:t>Index</a:t>
+            </a:r>
+          </a:p>
+          <a:p>
+            <a:r>
+              <a:rPr lang="en-SG" dirty="0">
                 <a:solidFill>
                   <a:schemeClr val="accent6">
                     <a:lumMod val="75000"/>
                   </a:schemeClr>
                 </a:solidFill>
               </a:rPr>
-              <a:t>files</a:t>
+              <a:t>Files</a:t>
             </a:r>
             <a:r>
               <a:rPr lang="en-SG" dirty="0"/>
@@ -4212,7 +4224,7 @@
               <a:t>Retrieve </a:t>
             </a:r>
             <a:r>
-              <a:rPr lang="en-SG" b="1" dirty="0">
+              <a:rPr lang="en-SG" dirty="0">
                 <a:solidFill>
                   <a:schemeClr val="accent4">
                     <a:lumMod val="75000"/>
@@ -4223,7 +4235,7 @@
             </a:r>
             <a:r>
               <a:rPr lang="en-SG" dirty="0"/>
-              <a:t>of results from cache or network request</a:t>
+              <a:t>of result set from cache or network request</a:t>
             </a:r>
           </a:p>
         </p:txBody>
@@ -4275,7 +4287,7 @@
               <a:t>Use </a:t>
             </a:r>
             <a:r>
-              <a:rPr lang="en-SG" b="1" dirty="0">
+              <a:rPr lang="en-SG" dirty="0">
                 <a:solidFill>
                   <a:schemeClr val="accent4">
                     <a:lumMod val="75000"/>
@@ -4291,16 +4303,16 @@
             <a:r>
               <a:rPr lang="en-SG" dirty="0">
                 <a:solidFill>
-                  <a:schemeClr val="bg2">
-                    <a:lumMod val="10000"/>
+                  <a:schemeClr val="accent2">
+                    <a:lumMod val="75000"/>
                   </a:schemeClr>
                 </a:solidFill>
               </a:rPr>
-              <a:t>corpus’ </a:t>
+              <a:t>corpus’</a:t>
             </a:r>
             <a:r>
               <a:rPr lang="en-SG" dirty="0"/>
-              <a:t>source files to generate </a:t>
+              <a:t> source files to generate </a:t>
             </a:r>
             <a:r>
               <a:rPr lang="en-SG" b="1" dirty="0"/>

</xml_diff>

<commit_message>
Deploying to gh-pages from @ ang-zeyu/morsels@ee0f9c3065b33d11ca09926f778b77e9b28ea982 🚀
</commit_message>
<xml_diff>
--- a/images/architecture.pptx
+++ b/images/architecture.pptx
@@ -261,7 +261,7 @@
           <a:p>
             <a:fld id="{4B3D9AB3-1BEE-469F-B79E-0D7A28C81A9F}" type="datetimeFigureOut">
               <a:rPr lang="en-SG" smtClean="0"/>
-              <a:t>29/1/2022</a:t>
+              <a:t>17/5/2022</a:t>
             </a:fld>
             <a:endParaRPr lang="en-SG"/>
           </a:p>
@@ -461,7 +461,7 @@
           <a:p>
             <a:fld id="{4B3D9AB3-1BEE-469F-B79E-0D7A28C81A9F}" type="datetimeFigureOut">
               <a:rPr lang="en-SG" smtClean="0"/>
-              <a:t>29/1/2022</a:t>
+              <a:t>17/5/2022</a:t>
             </a:fld>
             <a:endParaRPr lang="en-SG"/>
           </a:p>
@@ -671,7 +671,7 @@
           <a:p>
             <a:fld id="{4B3D9AB3-1BEE-469F-B79E-0D7A28C81A9F}" type="datetimeFigureOut">
               <a:rPr lang="en-SG" smtClean="0"/>
-              <a:t>29/1/2022</a:t>
+              <a:t>17/5/2022</a:t>
             </a:fld>
             <a:endParaRPr lang="en-SG"/>
           </a:p>
@@ -871,7 +871,7 @@
           <a:p>
             <a:fld id="{4B3D9AB3-1BEE-469F-B79E-0D7A28C81A9F}" type="datetimeFigureOut">
               <a:rPr lang="en-SG" smtClean="0"/>
-              <a:t>29/1/2022</a:t>
+              <a:t>17/5/2022</a:t>
             </a:fld>
             <a:endParaRPr lang="en-SG"/>
           </a:p>
@@ -1147,7 +1147,7 @@
           <a:p>
             <a:fld id="{4B3D9AB3-1BEE-469F-B79E-0D7A28C81A9F}" type="datetimeFigureOut">
               <a:rPr lang="en-SG" smtClean="0"/>
-              <a:t>29/1/2022</a:t>
+              <a:t>17/5/2022</a:t>
             </a:fld>
             <a:endParaRPr lang="en-SG"/>
           </a:p>
@@ -1415,7 +1415,7 @@
           <a:p>
             <a:fld id="{4B3D9AB3-1BEE-469F-B79E-0D7A28C81A9F}" type="datetimeFigureOut">
               <a:rPr lang="en-SG" smtClean="0"/>
-              <a:t>29/1/2022</a:t>
+              <a:t>17/5/2022</a:t>
             </a:fld>
             <a:endParaRPr lang="en-SG"/>
           </a:p>
@@ -1830,7 +1830,7 @@
           <a:p>
             <a:fld id="{4B3D9AB3-1BEE-469F-B79E-0D7A28C81A9F}" type="datetimeFigureOut">
               <a:rPr lang="en-SG" smtClean="0"/>
-              <a:t>29/1/2022</a:t>
+              <a:t>17/5/2022</a:t>
             </a:fld>
             <a:endParaRPr lang="en-SG"/>
           </a:p>
@@ -1972,7 +1972,7 @@
           <a:p>
             <a:fld id="{4B3D9AB3-1BEE-469F-B79E-0D7A28C81A9F}" type="datetimeFigureOut">
               <a:rPr lang="en-SG" smtClean="0"/>
-              <a:t>29/1/2022</a:t>
+              <a:t>17/5/2022</a:t>
             </a:fld>
             <a:endParaRPr lang="en-SG"/>
           </a:p>
@@ -2085,7 +2085,7 @@
           <a:p>
             <a:fld id="{4B3D9AB3-1BEE-469F-B79E-0D7A28C81A9F}" type="datetimeFigureOut">
               <a:rPr lang="en-SG" smtClean="0"/>
-              <a:t>29/1/2022</a:t>
+              <a:t>17/5/2022</a:t>
             </a:fld>
             <a:endParaRPr lang="en-SG"/>
           </a:p>
@@ -2398,7 +2398,7 @@
           <a:p>
             <a:fld id="{4B3D9AB3-1BEE-469F-B79E-0D7A28C81A9F}" type="datetimeFigureOut">
               <a:rPr lang="en-SG" smtClean="0"/>
-              <a:t>29/1/2022</a:t>
+              <a:t>17/5/2022</a:t>
             </a:fld>
             <a:endParaRPr lang="en-SG"/>
           </a:p>
@@ -2687,7 +2687,7 @@
           <a:p>
             <a:fld id="{4B3D9AB3-1BEE-469F-B79E-0D7A28C81A9F}" type="datetimeFigureOut">
               <a:rPr lang="en-SG" smtClean="0"/>
-              <a:t>29/1/2022</a:t>
+              <a:t>17/5/2022</a:t>
             </a:fld>
             <a:endParaRPr lang="en-SG"/>
           </a:p>
@@ -2930,7 +2930,7 @@
           <a:p>
             <a:fld id="{4B3D9AB3-1BEE-469F-B79E-0D7A28C81A9F}" type="datetimeFigureOut">
               <a:rPr lang="en-SG" smtClean="0"/>
-              <a:t>29/1/2022</a:t>
+              <a:t>17/5/2022</a:t>
             </a:fld>
             <a:endParaRPr lang="en-SG"/>
           </a:p>
@@ -3361,8 +3361,8 @@
         </p:nvSpPr>
         <p:spPr>
           <a:xfrm>
-            <a:off x="525294" y="343711"/>
-            <a:ext cx="1880680" cy="1361872"/>
+            <a:off x="525294" y="390726"/>
+            <a:ext cx="1880680" cy="1267841"/>
           </a:xfrm>
           <a:prstGeom prst="roundRect">
             <a:avLst/>
@@ -3393,8 +3393,8 @@
             <a:r>
               <a:rPr lang="en-SG" dirty="0">
                 <a:solidFill>
-                  <a:schemeClr val="accent2">
-                    <a:lumMod val="75000"/>
+                  <a:schemeClr val="bg2">
+                    <a:lumMod val="10000"/>
                   </a:schemeClr>
                 </a:solidFill>
               </a:rPr>
@@ -3442,6 +3442,12 @@
           <a:prstGeom prst="roundRect">
             <a:avLst/>
           </a:prstGeom>
+          <a:solidFill>
+            <a:schemeClr val="accent4">
+              <a:lumMod val="40000"/>
+              <a:lumOff val="60000"/>
+            </a:schemeClr>
+          </a:solidFill>
           <a:ln>
             <a:noFill/>
           </a:ln>
@@ -3466,23 +3472,20 @@
           <a:p>
             <a:pPr algn="ctr"/>
             <a:r>
-              <a:rPr lang="en-SG" dirty="0">
+              <a:rPr lang="en-SG" b="1" dirty="0" err="1">
                 <a:solidFill>
                   <a:schemeClr val="tx1"/>
                 </a:solidFill>
               </a:rPr>
-              <a:t>Morsels’ </a:t>
-            </a:r>
-          </a:p>
-          <a:p>
-            <a:pPr algn="ctr"/>
-            <a:r>
-              <a:rPr lang="en-SG" dirty="0">
+              <a:t>Cli</a:t>
+            </a:r>
+            <a:r>
+              <a:rPr lang="en-SG" b="1" dirty="0">
                 <a:solidFill>
                   <a:schemeClr val="tx1"/>
                 </a:solidFill>
               </a:rPr>
-              <a:t>cli indexer tool</a:t>
+              <a:t> indexer tool</a:t>
             </a:r>
           </a:p>
         </p:txBody>
@@ -3582,7 +3585,7 @@
               <a:t>Inverted </a:t>
             </a:r>
             <a:r>
-              <a:rPr lang="en-SG" dirty="0">
+              <a:rPr lang="en-SG" b="1" dirty="0">
                 <a:solidFill>
                   <a:schemeClr val="accent6">
                     <a:lumMod val="75000"/>
@@ -3595,16 +3598,6 @@
           <a:p>
             <a:pPr algn="ctr"/>
             <a:r>
-              <a:rPr lang="en-SG" dirty="0">
-                <a:solidFill>
-                  <a:schemeClr val="accent6">
-                    <a:lumMod val="75000"/>
-                  </a:schemeClr>
-                </a:solidFill>
-              </a:rPr>
-              <a:t>File</a:t>
-            </a:r>
-            <a:r>
               <a:rPr lang="en-SG" b="1" dirty="0">
                 <a:solidFill>
                   <a:schemeClr val="accent6">
@@ -3612,7 +3605,7 @@
                   </a:schemeClr>
                 </a:solidFill>
               </a:rPr>
-              <a:t>(s)</a:t>
+              <a:t>File(s)</a:t>
             </a:r>
           </a:p>
         </p:txBody>
@@ -3669,7 +3662,7 @@
               <a:t>Json </a:t>
             </a:r>
             <a:r>
-              <a:rPr lang="en-SG" dirty="0">
+              <a:rPr lang="en-SG" b="1" dirty="0">
                 <a:solidFill>
                   <a:schemeClr val="accent4">
                     <a:lumMod val="75000"/>
@@ -3903,10 +3896,12 @@
         <p:spPr>
           <a:xfrm>
             <a:off x="278859" y="3897548"/>
-            <a:ext cx="10000035" cy="2866417"/>
+            <a:ext cx="9656323" cy="2866417"/>
           </a:xfrm>
           <a:prstGeom prst="roundRect">
-            <a:avLst/>
+            <a:avLst>
+              <a:gd name="adj" fmla="val 8523"/>
+            </a:avLst>
           </a:prstGeom>
           <a:noFill/>
         </p:spPr>
@@ -3949,15 +3944,24 @@
         </p:nvSpPr>
         <p:spPr>
           <a:xfrm>
-            <a:off x="8746788" y="4133720"/>
-            <a:ext cx="1322959" cy="1008437"/>
+            <a:off x="8466311" y="4027250"/>
+            <a:ext cx="1322959" cy="875224"/>
           </a:xfrm>
           <a:prstGeom prst="roundRect">
-            <a:avLst/>
+            <a:avLst>
+              <a:gd name="adj" fmla="val 20525"/>
+            </a:avLst>
           </a:prstGeom>
+          <a:solidFill>
+            <a:schemeClr val="accent4">
+              <a:lumMod val="40000"/>
+              <a:lumOff val="60000"/>
+            </a:schemeClr>
+          </a:solidFill>
           <a:ln>
             <a:noFill/>
           </a:ln>
+          <a:effectLst/>
         </p:spPr>
         <p:style>
           <a:lnRef idx="0">
@@ -3979,28 +3983,12 @@
           <a:p>
             <a:pPr algn="ctr"/>
             <a:r>
-              <a:rPr lang="en-SG" dirty="0">
+              <a:rPr lang="en-SG" b="1" dirty="0">
                 <a:solidFill>
                   <a:schemeClr val="tx1"/>
                 </a:solidFill>
               </a:rPr>
-              <a:t>Morsels’ search </a:t>
-            </a:r>
-            <a:r>
-              <a:rPr lang="en-SG" dirty="0" err="1">
-                <a:solidFill>
-                  <a:schemeClr val="tx1"/>
-                </a:solidFill>
-              </a:rPr>
-              <a:t>ui</a:t>
-            </a:r>
-            <a:r>
-              <a:rPr lang="en-SG" dirty="0">
-                <a:solidFill>
-                  <a:schemeClr val="tx1"/>
-                </a:solidFill>
-              </a:rPr>
-              <a:t> / library</a:t>
+              <a:t>Search UI &amp; library</a:t>
             </a:r>
           </a:p>
         </p:txBody>
@@ -4079,7 +4067,7 @@
               <a:t>Parse, Process, and figure out which </a:t>
             </a:r>
             <a:r>
-              <a:rPr lang="en-SG" dirty="0">
+              <a:rPr lang="en-SG" b="1" dirty="0">
                 <a:solidFill>
                   <a:schemeClr val="accent6">
                     <a:lumMod val="75000"/>
@@ -4128,26 +4116,26 @@
               <a:t>Retrieve </a:t>
             </a:r>
             <a:r>
-              <a:rPr lang="en-SG" dirty="0">
+              <a:rPr lang="en-SG" b="1" dirty="0">
                 <a:solidFill>
                   <a:schemeClr val="accent6">
                     <a:lumMod val="75000"/>
                   </a:schemeClr>
                 </a:solidFill>
               </a:rPr>
-              <a:t>Index</a:t>
-            </a:r>
-          </a:p>
-          <a:p>
-            <a:r>
-              <a:rPr lang="en-SG" dirty="0">
+              <a:t>index</a:t>
+            </a:r>
+          </a:p>
+          <a:p>
+            <a:r>
+              <a:rPr lang="en-SG" b="1" dirty="0">
                 <a:solidFill>
                   <a:schemeClr val="accent6">
                     <a:lumMod val="75000"/>
                   </a:schemeClr>
                 </a:solidFill>
               </a:rPr>
-              <a:t>Files</a:t>
+              <a:t>files</a:t>
             </a:r>
             <a:r>
               <a:rPr lang="en-SG" dirty="0"/>
@@ -4224,7 +4212,7 @@
               <a:t>Retrieve </a:t>
             </a:r>
             <a:r>
-              <a:rPr lang="en-SG" dirty="0">
+              <a:rPr lang="en-SG" b="1" dirty="0">
                 <a:solidFill>
                   <a:schemeClr val="accent4">
                     <a:lumMod val="75000"/>
@@ -4235,7 +4223,7 @@
             </a:r>
             <a:r>
               <a:rPr lang="en-SG" dirty="0"/>
-              <a:t>of result set from cache or network request</a:t>
+              <a:t>of results from cache or network request</a:t>
             </a:r>
           </a:p>
         </p:txBody>
@@ -4287,7 +4275,7 @@
               <a:t>Use </a:t>
             </a:r>
             <a:r>
-              <a:rPr lang="en-SG" dirty="0">
+              <a:rPr lang="en-SG" b="1" dirty="0">
                 <a:solidFill>
                   <a:schemeClr val="accent4">
                     <a:lumMod val="75000"/>
@@ -4303,16 +4291,16 @@
             <a:r>
               <a:rPr lang="en-SG" dirty="0">
                 <a:solidFill>
-                  <a:schemeClr val="accent2">
-                    <a:lumMod val="75000"/>
+                  <a:schemeClr val="bg2">
+                    <a:lumMod val="10000"/>
                   </a:schemeClr>
                 </a:solidFill>
               </a:rPr>
-              <a:t>corpus’</a:t>
+              <a:t>corpus’ </a:t>
             </a:r>
             <a:r>
               <a:rPr lang="en-SG" dirty="0"/>
-              <a:t> source files to generate </a:t>
+              <a:t>source files to generate </a:t>
             </a:r>
             <a:r>
               <a:rPr lang="en-SG" b="1" dirty="0"/>

</xml_diff>